<commit_message>
Modificacion arboles printf y scanf
</commit_message>
<xml_diff>
--- a/Arboles/Scanf.pptx
+++ b/Arboles/Scanf.pptx
@@ -3063,16 +3063,8 @@
       </p:sp>
       <p:pic>
         <p:nvPicPr>
-          <p:cNvPr id="3" name="Imagen 2">
-            <a:extLst>
-              <a:ext uri="{FF2B5EF4-FFF2-40B4-BE49-F238E27FC236}">
-                <a16:creationId xmlns:a16="http://schemas.microsoft.com/office/drawing/2014/main" id="{B004C108-138D-487A-851F-27F2910AA62B}"/>
-              </a:ext>
-            </a:extLst>
-          </p:cNvPr>
-          <p:cNvPicPr>
-            <a:picLocks noChangeAspect="1"/>
-          </p:cNvPicPr>
+          <p:cNvPr id="4" name="Imagen 3"/>
+          <p:cNvPicPr/>
           <p:nvPr/>
         </p:nvPicPr>
         <p:blipFill>
@@ -3083,8 +3075,8 @@
         </p:blipFill>
         <p:spPr>
           <a:xfrm>
-            <a:off x="1793127" y="4026933"/>
-            <a:ext cx="8605746" cy="1414644"/>
+            <a:off x="3404382" y="4301905"/>
+            <a:ext cx="5774446" cy="1240766"/>
           </a:xfrm>
           <a:prstGeom prst="rect">
             <a:avLst/>
@@ -3159,8 +3151,8 @@
         </p:nvSpPr>
         <p:spPr>
           <a:xfrm>
-            <a:off x="3078570" y="1249680"/>
-            <a:ext cx="657439" cy="307777"/>
+            <a:off x="1589339" y="1423907"/>
+            <a:ext cx="814450" cy="369332"/>
           </a:xfrm>
           <a:prstGeom prst="rect">
             <a:avLst/>
@@ -3174,10 +3166,10 @@
           <a:lstStyle/>
           <a:p>
             <a:r>
-              <a:rPr lang="es-ES" sz="1400" dirty="0" err="1"/>
+              <a:rPr lang="es-ES" dirty="0"/>
               <a:t>scanf</a:t>
             </a:r>
-            <a:endParaRPr lang="en-US" sz="1400" dirty="0"/>
+            <a:endParaRPr lang="en-US" dirty="0"/>
           </a:p>
         </p:txBody>
       </p:sp>
@@ -3189,8 +3181,8 @@
         </p:nvSpPr>
         <p:spPr>
           <a:xfrm>
-            <a:off x="4067129" y="1249679"/>
-            <a:ext cx="239168" cy="307777"/>
+            <a:off x="2747697" y="1423907"/>
+            <a:ext cx="255198" cy="369332"/>
           </a:xfrm>
           <a:prstGeom prst="rect">
             <a:avLst/>
@@ -3204,23 +3196,23 @@
           <a:lstStyle/>
           <a:p>
             <a:r>
-              <a:rPr lang="es-ES" sz="1400" dirty="0"/>
+              <a:rPr lang="es-ES" dirty="0"/>
               <a:t>(</a:t>
             </a:r>
-            <a:endParaRPr lang="en-US" sz="1400" dirty="0"/>
-          </a:p>
-        </p:txBody>
-      </p:sp>
-      <p:sp>
-        <p:nvSpPr>
-          <p:cNvPr id="7" name="CuadroTexto 6"/>
+            <a:endParaRPr lang="en-US" dirty="0"/>
+          </a:p>
+        </p:txBody>
+      </p:sp>
+      <p:sp>
+        <p:nvSpPr>
+          <p:cNvPr id="8" name="CuadroTexto 7"/>
           <p:cNvSpPr txBox="1"/>
           <p:nvPr/>
         </p:nvSpPr>
         <p:spPr>
           <a:xfrm>
-            <a:off x="4584221" y="1239680"/>
-            <a:ext cx="2053896" cy="307777"/>
+            <a:off x="9114861" y="1415927"/>
+            <a:ext cx="255198" cy="369332"/>
           </a:xfrm>
           <a:prstGeom prst="rect">
             <a:avLst/>
@@ -3234,40 +3226,10 @@
           <a:lstStyle/>
           <a:p>
             <a:r>
-              <a:rPr lang="es-ES" sz="1400" dirty="0"/>
-              <a:t>CADENA_CON_FORMATO</a:t>
-            </a:r>
-            <a:endParaRPr lang="en-US" sz="1400" dirty="0"/>
-          </a:p>
-        </p:txBody>
-      </p:sp>
-      <p:sp>
-        <p:nvSpPr>
-          <p:cNvPr id="8" name="CuadroTexto 7"/>
-          <p:cNvSpPr txBox="1"/>
-          <p:nvPr/>
-        </p:nvSpPr>
-        <p:spPr>
-          <a:xfrm>
-            <a:off x="8593065" y="1241698"/>
-            <a:ext cx="239168" cy="307777"/>
-          </a:xfrm>
-          <a:prstGeom prst="rect">
-            <a:avLst/>
-          </a:prstGeom>
-          <a:noFill/>
-        </p:spPr>
-        <p:txBody>
-          <a:bodyPr wrap="none" rtlCol="0">
-            <a:spAutoFit/>
-          </a:bodyPr>
-          <a:lstStyle/>
-          <a:p>
-            <a:r>
-              <a:rPr lang="es-ES" sz="1400" dirty="0"/>
+              <a:rPr lang="es-ES" dirty="0"/>
               <a:t>)</a:t>
             </a:r>
-            <a:endParaRPr lang="en-US" sz="1400" dirty="0"/>
+            <a:endParaRPr lang="en-US" dirty="0"/>
           </a:p>
         </p:txBody>
       </p:sp>
@@ -3283,8 +3245,8 @@
         </p:nvCxnSpPr>
         <p:spPr>
           <a:xfrm flipH="1">
-            <a:off x="3407290" y="428994"/>
-            <a:ext cx="2674942" cy="820686"/>
+            <a:off x="1996564" y="428994"/>
+            <a:ext cx="4085668" cy="994913"/>
           </a:xfrm>
           <a:prstGeom prst="line">
             <a:avLst/>
@@ -3317,42 +3279,8 @@
         </p:nvCxnSpPr>
         <p:spPr>
           <a:xfrm flipH="1">
-            <a:off x="4186713" y="428994"/>
-            <a:ext cx="1895519" cy="820685"/>
-          </a:xfrm>
-          <a:prstGeom prst="line">
-            <a:avLst/>
-          </a:prstGeom>
-        </p:spPr>
-        <p:style>
-          <a:lnRef idx="1">
-            <a:schemeClr val="accent1"/>
-          </a:lnRef>
-          <a:fillRef idx="0">
-            <a:schemeClr val="accent1"/>
-          </a:fillRef>
-          <a:effectRef idx="0">
-            <a:schemeClr val="accent1"/>
-          </a:effectRef>
-          <a:fontRef idx="minor">
-            <a:schemeClr val="tx1"/>
-          </a:fontRef>
-        </p:style>
-      </p:cxnSp>
-      <p:cxnSp>
-        <p:nvCxnSpPr>
-          <p:cNvPr id="22" name="Conector recto 21"/>
-          <p:cNvCxnSpPr>
-            <a:cxnSpLocks/>
-            <a:stCxn id="4" idx="2"/>
-            <a:endCxn id="7" idx="0"/>
-          </p:cNvCxnSpPr>
-          <p:nvPr/>
-        </p:nvCxnSpPr>
-        <p:spPr>
-          <a:xfrm flipH="1">
-            <a:off x="5611169" y="428994"/>
-            <a:ext cx="471063" cy="810686"/>
+            <a:off x="2875296" y="428994"/>
+            <a:ext cx="3206936" cy="994913"/>
           </a:xfrm>
           <a:prstGeom prst="line">
             <a:avLst/>
@@ -3386,7 +3314,7 @@
         <p:spPr>
           <a:xfrm>
             <a:off x="6082232" y="428994"/>
-            <a:ext cx="2630417" cy="812704"/>
+            <a:ext cx="3160228" cy="986933"/>
           </a:xfrm>
           <a:prstGeom prst="line">
             <a:avLst/>
@@ -3421,8 +3349,8 @@
         </p:nvSpPr>
         <p:spPr>
           <a:xfrm>
-            <a:off x="6711587" y="1239679"/>
-            <a:ext cx="229551" cy="307777"/>
+            <a:off x="7226971" y="1413908"/>
+            <a:ext cx="242375" cy="369332"/>
           </a:xfrm>
           <a:prstGeom prst="rect">
             <a:avLst/>
@@ -3437,46 +3365,10 @@
           <a:p>
             <a:pPr algn="ctr"/>
             <a:r>
-              <a:rPr lang="es-ES" sz="1400" dirty="0"/>
+              <a:rPr lang="es-ES" dirty="0"/>
               <a:t>,</a:t>
             </a:r>
-            <a:endParaRPr lang="en-US" sz="1400" dirty="0"/>
-          </a:p>
-        </p:txBody>
-      </p:sp>
-      <p:sp>
-        <p:nvSpPr>
-          <p:cNvPr id="76" name="CuadroTexto 75">
-            <a:extLst>
-              <a:ext uri="{FF2B5EF4-FFF2-40B4-BE49-F238E27FC236}">
-                <a16:creationId xmlns:a16="http://schemas.microsoft.com/office/drawing/2014/main" id="{02B0C277-2696-4CDB-956F-F88346418039}"/>
-              </a:ext>
-            </a:extLst>
-          </p:cNvPr>
-          <p:cNvSpPr txBox="1"/>
-          <p:nvPr/>
-        </p:nvSpPr>
-        <p:spPr>
-          <a:xfrm>
-            <a:off x="7080561" y="1249678"/>
-            <a:ext cx="1330814" cy="307777"/>
-          </a:xfrm>
-          <a:prstGeom prst="rect">
-            <a:avLst/>
-          </a:prstGeom>
-          <a:noFill/>
-        </p:spPr>
-        <p:txBody>
-          <a:bodyPr wrap="none" rtlCol="0">
-            <a:spAutoFit/>
-          </a:bodyPr>
-          <a:lstStyle/>
-          <a:p>
-            <a:r>
-              <a:rPr lang="es-ES" sz="1400" dirty="0"/>
-              <a:t>IDENTIFICADOR</a:t>
-            </a:r>
-            <a:endParaRPr lang="en-US" sz="1400" dirty="0"/>
+            <a:endParaRPr lang="en-US" dirty="0"/>
           </a:p>
         </p:txBody>
       </p:sp>
@@ -3494,8 +3386,8 @@
         </p:nvSpPr>
         <p:spPr>
           <a:xfrm>
-            <a:off x="9067334" y="1239678"/>
-            <a:ext cx="232756" cy="307777"/>
+            <a:off x="9589130" y="1413907"/>
+            <a:ext cx="247184" cy="369332"/>
           </a:xfrm>
           <a:prstGeom prst="rect">
             <a:avLst/>
@@ -3509,10 +3401,10 @@
           <a:lstStyle/>
           <a:p>
             <a:r>
-              <a:rPr lang="es-ES" sz="1400" dirty="0"/>
+              <a:rPr lang="es-ES" dirty="0"/>
               <a:t>;</a:t>
             </a:r>
-            <a:endParaRPr lang="en-US" sz="1400" dirty="0"/>
+            <a:endParaRPr lang="en-US" dirty="0"/>
           </a:p>
         </p:txBody>
       </p:sp>
@@ -3534,46 +3426,7 @@
         <p:spPr>
           <a:xfrm>
             <a:off x="6082232" y="428994"/>
-            <a:ext cx="744131" cy="810685"/>
-          </a:xfrm>
-          <a:prstGeom prst="line">
-            <a:avLst/>
-          </a:prstGeom>
-        </p:spPr>
-        <p:style>
-          <a:lnRef idx="1">
-            <a:schemeClr val="accent1"/>
-          </a:lnRef>
-          <a:fillRef idx="0">
-            <a:schemeClr val="accent1"/>
-          </a:fillRef>
-          <a:effectRef idx="0">
-            <a:schemeClr val="accent1"/>
-          </a:effectRef>
-          <a:fontRef idx="minor">
-            <a:schemeClr val="tx1"/>
-          </a:fontRef>
-        </p:style>
-      </p:cxnSp>
-      <p:cxnSp>
-        <p:nvCxnSpPr>
-          <p:cNvPr id="46" name="Conector recto 45">
-            <a:extLst>
-              <a:ext uri="{FF2B5EF4-FFF2-40B4-BE49-F238E27FC236}">
-                <a16:creationId xmlns:a16="http://schemas.microsoft.com/office/drawing/2014/main" id="{C63229BD-8730-4A53-B660-7A3F4FE73A74}"/>
-              </a:ext>
-            </a:extLst>
-          </p:cNvPr>
-          <p:cNvCxnSpPr>
-            <a:stCxn id="4" idx="2"/>
-            <a:endCxn id="76" idx="0"/>
-          </p:cNvCxnSpPr>
-          <p:nvPr/>
-        </p:nvCxnSpPr>
-        <p:spPr>
-          <a:xfrm>
-            <a:off x="6082232" y="428994"/>
-            <a:ext cx="1663736" cy="820684"/>
+            <a:ext cx="1265927" cy="984914"/>
           </a:xfrm>
           <a:prstGeom prst="line">
             <a:avLst/>
@@ -3612,7 +3465,7 @@
         <p:spPr>
           <a:xfrm>
             <a:off x="6082232" y="428994"/>
-            <a:ext cx="3101480" cy="810684"/>
+            <a:ext cx="3630490" cy="984913"/>
           </a:xfrm>
           <a:prstGeom prst="line">
             <a:avLst/>
@@ -3635,20 +3488,14 @@
       </p:cxnSp>
       <p:sp>
         <p:nvSpPr>
-          <p:cNvPr id="17" name="CuadroTexto 16">
-            <a:extLst>
-              <a:ext uri="{FF2B5EF4-FFF2-40B4-BE49-F238E27FC236}">
-                <a16:creationId xmlns:a16="http://schemas.microsoft.com/office/drawing/2014/main" id="{82FF57C0-BA44-4D2D-9CA1-2CCF6DCFC1F5}"/>
-              </a:ext>
-            </a:extLst>
-          </p:cNvPr>
+          <p:cNvPr id="29" name="CuadroTexto 28"/>
           <p:cNvSpPr txBox="1"/>
           <p:nvPr/>
         </p:nvSpPr>
         <p:spPr>
           <a:xfrm>
-            <a:off x="5147676" y="2358143"/>
-            <a:ext cx="926985" cy="307777"/>
+            <a:off x="3975916" y="1429200"/>
+            <a:ext cx="1729961" cy="369332"/>
           </a:xfrm>
           <a:prstGeom prst="rect">
             <a:avLst/>
@@ -3662,71 +3509,35 @@
           <a:lstStyle/>
           <a:p>
             <a:r>
-              <a:rPr lang="en-US" sz="1400" dirty="0"/>
-              <a:t>FORMATO</a:t>
-            </a:r>
-          </a:p>
-        </p:txBody>
-      </p:sp>
-      <p:sp>
-        <p:nvSpPr>
-          <p:cNvPr id="19" name="CuadroTexto 18">
-            <a:extLst>
-              <a:ext uri="{FF2B5EF4-FFF2-40B4-BE49-F238E27FC236}">
-                <a16:creationId xmlns:a16="http://schemas.microsoft.com/office/drawing/2014/main" id="{738CAE4C-C70E-454B-83D0-A221A95A0F9A}"/>
-              </a:ext>
-            </a:extLst>
-          </p:cNvPr>
-          <p:cNvSpPr txBox="1"/>
-          <p:nvPr/>
-        </p:nvSpPr>
-        <p:spPr>
-          <a:xfrm>
-            <a:off x="4945762" y="3287895"/>
-            <a:ext cx="1330814" cy="307777"/>
-          </a:xfrm>
-          <a:prstGeom prst="rect">
-            <a:avLst/>
-          </a:prstGeom>
-          <a:noFill/>
-        </p:spPr>
-        <p:txBody>
-          <a:bodyPr wrap="none" rtlCol="0">
-            <a:spAutoFit/>
-          </a:bodyPr>
-          <a:lstStyle/>
-          <a:p>
-            <a:r>
-              <a:rPr lang="es-ES" sz="1400" dirty="0"/>
-              <a:t>IDENTIFICADOR</a:t>
-            </a:r>
-            <a:endParaRPr lang="en-US" sz="1400" dirty="0"/>
+              <a:rPr lang="es-ES" dirty="0"/>
+              <a:t>STRING_LITERAL</a:t>
+            </a:r>
+            <a:endParaRPr lang="en-US" dirty="0"/>
           </a:p>
         </p:txBody>
       </p:sp>
       <p:cxnSp>
         <p:nvCxnSpPr>
-          <p:cNvPr id="21" name="Conector recto 20">
-            <a:extLst>
-              <a:ext uri="{FF2B5EF4-FFF2-40B4-BE49-F238E27FC236}">
-                <a16:creationId xmlns:a16="http://schemas.microsoft.com/office/drawing/2014/main" id="{00054CA2-BA32-4225-BE1D-D92E0759D11F}"/>
-              </a:ext>
-            </a:extLst>
-          </p:cNvPr>
+          <p:cNvPr id="30" name="Conector recto 29"/>
           <p:cNvCxnSpPr>
-            <a:stCxn id="17" idx="2"/>
-            <a:endCxn id="19" idx="0"/>
+            <a:stCxn id="29" idx="2"/>
+            <a:endCxn id="31" idx="0"/>
           </p:cNvCxnSpPr>
           <p:nvPr/>
         </p:nvCxnSpPr>
         <p:spPr>
-          <a:xfrm>
-            <a:off x="5611169" y="2665920"/>
-            <a:ext cx="0" cy="621975"/>
+          <a:xfrm flipH="1">
+            <a:off x="4801630" y="1798532"/>
+            <a:ext cx="39267" cy="889584"/>
           </a:xfrm>
           <a:prstGeom prst="line">
             <a:avLst/>
           </a:prstGeom>
+          <a:ln>
+            <a:solidFill>
+              <a:schemeClr val="accent6"/>
+            </a:solidFill>
+          </a:ln>
         </p:spPr>
         <p:style>
           <a:lnRef idx="1">
@@ -3745,10 +3556,10 @@
       </p:cxnSp>
       <p:sp>
         <p:nvSpPr>
-          <p:cNvPr id="23" name="CuadroTexto 22">
+          <p:cNvPr id="31" name="CuadroTexto 30">
             <a:extLst>
               <a:ext uri="{FF2B5EF4-FFF2-40B4-BE49-F238E27FC236}">
-                <a16:creationId xmlns:a16="http://schemas.microsoft.com/office/drawing/2014/main" id="{0AE4C62F-DF4F-4864-A537-13B728D05156}"/>
+                <a16:creationId xmlns:a16="http://schemas.microsoft.com/office/drawing/2014/main" id="{02B0C277-2696-4CDB-956F-F88346418039}"/>
               </a:ext>
             </a:extLst>
           </p:cNvPr>
@@ -3757,8 +3568,8 @@
         </p:nvSpPr>
         <p:spPr>
           <a:xfrm>
-            <a:off x="5230680" y="4316892"/>
-            <a:ext cx="760978" cy="307777"/>
+            <a:off x="3951365" y="2688116"/>
+            <a:ext cx="1700530" cy="369332"/>
           </a:xfrm>
           <a:prstGeom prst="rect">
             <a:avLst/>
@@ -3772,36 +3583,107 @@
           <a:lstStyle/>
           <a:p>
             <a:r>
-              <a:rPr lang="es-ES" sz="1400" dirty="0"/>
-              <a:t>nombre</a:t>
-            </a:r>
-            <a:endParaRPr lang="en-US" sz="1400" dirty="0"/>
-          </a:p>
-        </p:txBody>
-      </p:sp>
-      <p:cxnSp>
-        <p:nvCxnSpPr>
-          <p:cNvPr id="25" name="Conector recto 24">
+              <a:rPr lang="es-ES" dirty="0"/>
+              <a:t>COMPLEMENTO</a:t>
+            </a:r>
+            <a:endParaRPr lang="en-US" dirty="0"/>
+          </a:p>
+        </p:txBody>
+      </p:sp>
+      <p:sp>
+        <p:nvSpPr>
+          <p:cNvPr id="32" name="CuadroTexto 31">
             <a:extLst>
               <a:ext uri="{FF2B5EF4-FFF2-40B4-BE49-F238E27FC236}">
-                <a16:creationId xmlns:a16="http://schemas.microsoft.com/office/drawing/2014/main" id="{F2F54448-C67C-4C11-B251-E3B021D22D5E}"/>
+                <a16:creationId xmlns:a16="http://schemas.microsoft.com/office/drawing/2014/main" id="{02B0C277-2696-4CDB-956F-F88346418039}"/>
               </a:ext>
             </a:extLst>
           </p:cNvPr>
+          <p:cNvSpPr txBox="1"/>
+          <p:nvPr/>
+        </p:nvSpPr>
+        <p:spPr>
+          <a:xfrm>
+            <a:off x="5671523" y="2688117"/>
+            <a:ext cx="280846" cy="369332"/>
+          </a:xfrm>
+          <a:prstGeom prst="rect">
+            <a:avLst/>
+          </a:prstGeom>
+          <a:noFill/>
+        </p:spPr>
+        <p:txBody>
+          <a:bodyPr wrap="none" rtlCol="0">
+            <a:spAutoFit/>
+          </a:bodyPr>
+          <a:lstStyle/>
+          <a:p>
+            <a:r>
+              <a:rPr lang="es-ES" dirty="0"/>
+              <a:t>”</a:t>
+            </a:r>
+            <a:endParaRPr lang="en-US" dirty="0"/>
+          </a:p>
+        </p:txBody>
+      </p:sp>
+      <p:sp>
+        <p:nvSpPr>
+          <p:cNvPr id="33" name="CuadroTexto 32">
+            <a:extLst>
+              <a:ext uri="{FF2B5EF4-FFF2-40B4-BE49-F238E27FC236}">
+                <a16:creationId xmlns:a16="http://schemas.microsoft.com/office/drawing/2014/main" id="{02B0C277-2696-4CDB-956F-F88346418039}"/>
+              </a:ext>
+            </a:extLst>
+          </p:cNvPr>
+          <p:cNvSpPr txBox="1"/>
+          <p:nvPr/>
+        </p:nvSpPr>
+        <p:spPr>
+          <a:xfrm>
+            <a:off x="3222029" y="2688116"/>
+            <a:ext cx="280846" cy="369332"/>
+          </a:xfrm>
+          <a:prstGeom prst="rect">
+            <a:avLst/>
+          </a:prstGeom>
+          <a:noFill/>
+        </p:spPr>
+        <p:txBody>
+          <a:bodyPr wrap="none" rtlCol="0">
+            <a:spAutoFit/>
+          </a:bodyPr>
+          <a:lstStyle/>
+          <a:p>
+            <a:r>
+              <a:rPr lang="es-ES" dirty="0"/>
+              <a:t>“</a:t>
+            </a:r>
+            <a:endParaRPr lang="en-US" dirty="0"/>
+          </a:p>
+        </p:txBody>
+      </p:sp>
+      <p:cxnSp>
+        <p:nvCxnSpPr>
+          <p:cNvPr id="34" name="Conector recto 33"/>
           <p:cNvCxnSpPr>
-            <a:stCxn id="19" idx="2"/>
-            <a:endCxn id="23" idx="0"/>
+            <a:stCxn id="29" idx="2"/>
+            <a:endCxn id="33" idx="0"/>
           </p:cNvCxnSpPr>
           <p:nvPr/>
         </p:nvCxnSpPr>
         <p:spPr>
-          <a:xfrm>
-            <a:off x="5611169" y="3595672"/>
-            <a:ext cx="0" cy="721220"/>
+          <a:xfrm flipH="1">
+            <a:off x="3362452" y="1798532"/>
+            <a:ext cx="1478445" cy="889584"/>
           </a:xfrm>
           <a:prstGeom prst="line">
             <a:avLst/>
           </a:prstGeom>
+          <a:ln>
+            <a:solidFill>
+              <a:schemeClr val="accent6"/>
+            </a:solidFill>
+          </a:ln>
         </p:spPr>
         <p:style>
           <a:lnRef idx="1">
@@ -3820,27 +3702,26 @@
       </p:cxnSp>
       <p:cxnSp>
         <p:nvCxnSpPr>
-          <p:cNvPr id="3" name="Conector recto 2">
-            <a:extLst>
-              <a:ext uri="{FF2B5EF4-FFF2-40B4-BE49-F238E27FC236}">
-                <a16:creationId xmlns:a16="http://schemas.microsoft.com/office/drawing/2014/main" id="{61FA409C-C12B-43CE-9C3C-EAAC154C6318}"/>
-              </a:ext>
-            </a:extLst>
-          </p:cNvPr>
+          <p:cNvPr id="35" name="Conector recto 34"/>
           <p:cNvCxnSpPr>
-            <a:stCxn id="7" idx="2"/>
-            <a:endCxn id="17" idx="0"/>
+            <a:stCxn id="29" idx="2"/>
+            <a:endCxn id="32" idx="0"/>
           </p:cNvCxnSpPr>
           <p:nvPr/>
         </p:nvCxnSpPr>
         <p:spPr>
           <a:xfrm>
-            <a:off x="5611169" y="1547457"/>
-            <a:ext cx="0" cy="810686"/>
+            <a:off x="4840897" y="1798532"/>
+            <a:ext cx="971049" cy="889585"/>
           </a:xfrm>
           <a:prstGeom prst="line">
             <a:avLst/>
           </a:prstGeom>
+          <a:ln>
+            <a:solidFill>
+              <a:schemeClr val="accent6"/>
+            </a:solidFill>
+          </a:ln>
         </p:spPr>
         <p:style>
           <a:lnRef idx="1">
@@ -3859,20 +3740,14 @@
       </p:cxnSp>
       <p:sp>
         <p:nvSpPr>
-          <p:cNvPr id="26" name="CuadroTexto 25">
-            <a:extLst>
-              <a:ext uri="{FF2B5EF4-FFF2-40B4-BE49-F238E27FC236}">
-                <a16:creationId xmlns:a16="http://schemas.microsoft.com/office/drawing/2014/main" id="{3DE6955A-4352-44FA-BC75-9E6306536010}"/>
-              </a:ext>
-            </a:extLst>
-          </p:cNvPr>
+          <p:cNvPr id="42" name="CuadroTexto 41"/>
           <p:cNvSpPr txBox="1"/>
           <p:nvPr/>
         </p:nvSpPr>
         <p:spPr>
           <a:xfrm>
-            <a:off x="7101609" y="2358143"/>
-            <a:ext cx="1330814" cy="307777"/>
+            <a:off x="3975916" y="3834717"/>
+            <a:ext cx="1644809" cy="369332"/>
           </a:xfrm>
           <a:prstGeom prst="rect">
             <a:avLst/>
@@ -3886,29 +3761,23 @@
           <a:lstStyle/>
           <a:p>
             <a:r>
-              <a:rPr lang="es-ES" sz="1400" dirty="0"/>
-              <a:t>IDENTIFICADOR</a:t>
-            </a:r>
-            <a:endParaRPr lang="en-US" sz="1400" dirty="0"/>
-          </a:p>
-        </p:txBody>
-      </p:sp>
-      <p:sp>
-        <p:nvSpPr>
-          <p:cNvPr id="27" name="CuadroTexto 26">
-            <a:extLst>
-              <a:ext uri="{FF2B5EF4-FFF2-40B4-BE49-F238E27FC236}">
-                <a16:creationId xmlns:a16="http://schemas.microsoft.com/office/drawing/2014/main" id="{B4549B23-DA4E-4CFF-8CC4-2309ECB804C1}"/>
-              </a:ext>
-            </a:extLst>
-          </p:cNvPr>
+              <a:rPr lang="es-ES" dirty="0"/>
+              <a:t>TIPO_ENTRADA</a:t>
+            </a:r>
+            <a:endParaRPr lang="en-US" dirty="0"/>
+          </a:p>
+        </p:txBody>
+      </p:sp>
+      <p:sp>
+        <p:nvSpPr>
+          <p:cNvPr id="43" name="CuadroTexto 42"/>
           <p:cNvSpPr txBox="1"/>
           <p:nvPr/>
         </p:nvSpPr>
         <p:spPr>
           <a:xfrm>
-            <a:off x="7386527" y="3287895"/>
-            <a:ext cx="760978" cy="307777"/>
+            <a:off x="3616276" y="4981318"/>
+            <a:ext cx="349776" cy="369332"/>
           </a:xfrm>
           <a:prstGeom prst="rect">
             <a:avLst/>
@@ -3922,32 +3791,162 @@
           <a:lstStyle/>
           <a:p>
             <a:r>
-              <a:rPr lang="es-ES" sz="1400" dirty="0"/>
-              <a:t>nombre</a:t>
-            </a:r>
-            <a:endParaRPr lang="en-US" sz="1400" dirty="0"/>
+              <a:rPr lang="es-ES" dirty="0"/>
+              <a:t>%</a:t>
+            </a:r>
+            <a:endParaRPr lang="en-US" dirty="0"/>
           </a:p>
         </p:txBody>
       </p:sp>
       <p:cxnSp>
         <p:nvCxnSpPr>
-          <p:cNvPr id="28" name="Conector recto 27">
-            <a:extLst>
-              <a:ext uri="{FF2B5EF4-FFF2-40B4-BE49-F238E27FC236}">
-                <a16:creationId xmlns:a16="http://schemas.microsoft.com/office/drawing/2014/main" id="{BA01168E-197E-43E5-A72C-03FB7E381BCD}"/>
-              </a:ext>
-            </a:extLst>
-          </p:cNvPr>
+          <p:cNvPr id="45" name="Conector recto 44"/>
           <p:cNvCxnSpPr>
-            <a:stCxn id="26" idx="2"/>
-            <a:endCxn id="27" idx="0"/>
+            <a:stCxn id="42" idx="2"/>
+            <a:endCxn id="43" idx="0"/>
           </p:cNvCxnSpPr>
           <p:nvPr/>
         </p:nvCxnSpPr>
         <p:spPr>
-          <a:xfrm>
-            <a:off x="7767016" y="2665920"/>
-            <a:ext cx="0" cy="621975"/>
+          <a:xfrm flipH="1">
+            <a:off x="3791164" y="4204049"/>
+            <a:ext cx="1007157" cy="777269"/>
+          </a:xfrm>
+          <a:prstGeom prst="line">
+            <a:avLst/>
+          </a:prstGeom>
+          <a:ln>
+            <a:solidFill>
+              <a:schemeClr val="accent4"/>
+            </a:solidFill>
+          </a:ln>
+        </p:spPr>
+        <p:style>
+          <a:lnRef idx="1">
+            <a:schemeClr val="accent1"/>
+          </a:lnRef>
+          <a:fillRef idx="0">
+            <a:schemeClr val="accent1"/>
+          </a:fillRef>
+          <a:effectRef idx="0">
+            <a:schemeClr val="accent1"/>
+          </a:effectRef>
+          <a:fontRef idx="minor">
+            <a:schemeClr val="tx1"/>
+          </a:fontRef>
+        </p:style>
+      </p:cxnSp>
+      <p:sp>
+        <p:nvSpPr>
+          <p:cNvPr id="47" name="CuadroTexto 46"/>
+          <p:cNvSpPr txBox="1"/>
+          <p:nvPr/>
+        </p:nvSpPr>
+        <p:spPr>
+          <a:xfrm>
+            <a:off x="4415844" y="4981318"/>
+            <a:ext cx="764953" cy="369332"/>
+          </a:xfrm>
+          <a:prstGeom prst="rect">
+            <a:avLst/>
+          </a:prstGeom>
+          <a:noFill/>
+        </p:spPr>
+        <p:txBody>
+          <a:bodyPr wrap="none" rtlCol="0">
+            <a:spAutoFit/>
+          </a:bodyPr>
+          <a:lstStyle/>
+          <a:p>
+            <a:r>
+              <a:rPr lang="es-ES" dirty="0"/>
+              <a:t>LETRA</a:t>
+            </a:r>
+            <a:endParaRPr lang="en-US" dirty="0"/>
+          </a:p>
+        </p:txBody>
+      </p:sp>
+      <p:cxnSp>
+        <p:nvCxnSpPr>
+          <p:cNvPr id="49" name="Conector recto 48"/>
+          <p:cNvCxnSpPr>
+            <a:stCxn id="42" idx="2"/>
+            <a:endCxn id="47" idx="0"/>
+          </p:cNvCxnSpPr>
+          <p:nvPr/>
+        </p:nvCxnSpPr>
+        <p:spPr>
+          <a:xfrm>
+            <a:off x="4798321" y="4204049"/>
+            <a:ext cx="0" cy="777269"/>
+          </a:xfrm>
+          <a:prstGeom prst="line">
+            <a:avLst/>
+          </a:prstGeom>
+          <a:ln>
+            <a:solidFill>
+              <a:schemeClr val="accent4"/>
+            </a:solidFill>
+          </a:ln>
+        </p:spPr>
+        <p:style>
+          <a:lnRef idx="1">
+            <a:schemeClr val="accent1"/>
+          </a:lnRef>
+          <a:fillRef idx="0">
+            <a:schemeClr val="accent1"/>
+          </a:fillRef>
+          <a:effectRef idx="0">
+            <a:schemeClr val="accent1"/>
+          </a:effectRef>
+          <a:fontRef idx="minor">
+            <a:schemeClr val="tx1"/>
+          </a:fontRef>
+        </p:style>
+      </p:cxnSp>
+      <p:sp>
+        <p:nvSpPr>
+          <p:cNvPr id="50" name="CuadroTexto 49"/>
+          <p:cNvSpPr txBox="1"/>
+          <p:nvPr/>
+        </p:nvSpPr>
+        <p:spPr>
+          <a:xfrm>
+            <a:off x="4645074" y="5943253"/>
+            <a:ext cx="306494" cy="369332"/>
+          </a:xfrm>
+          <a:prstGeom prst="rect">
+            <a:avLst/>
+          </a:prstGeom>
+          <a:noFill/>
+        </p:spPr>
+        <p:txBody>
+          <a:bodyPr wrap="none" rtlCol="0">
+            <a:spAutoFit/>
+          </a:bodyPr>
+          <a:lstStyle/>
+          <a:p>
+            <a:r>
+              <a:rPr lang="es-ES" dirty="0"/>
+              <a:t>d</a:t>
+            </a:r>
+            <a:endParaRPr lang="en-US" dirty="0"/>
+          </a:p>
+        </p:txBody>
+      </p:sp>
+      <p:cxnSp>
+        <p:nvCxnSpPr>
+          <p:cNvPr id="51" name="Conector recto 50"/>
+          <p:cNvCxnSpPr>
+            <a:stCxn id="47" idx="2"/>
+            <a:endCxn id="50" idx="0"/>
+          </p:cNvCxnSpPr>
+          <p:nvPr/>
+        </p:nvCxnSpPr>
+        <p:spPr>
+          <a:xfrm>
+            <a:off x="4798321" y="5350650"/>
+            <a:ext cx="0" cy="592603"/>
           </a:xfrm>
           <a:prstGeom prst="line">
             <a:avLst/>
@@ -3970,27 +3969,238 @@
       </p:cxnSp>
       <p:cxnSp>
         <p:nvCxnSpPr>
-          <p:cNvPr id="14" name="Conector recto 13">
+          <p:cNvPr id="36" name="Conector recto 35"/>
+          <p:cNvCxnSpPr>
+            <a:stCxn id="31" idx="2"/>
+            <a:endCxn id="42" idx="0"/>
+          </p:cNvCxnSpPr>
+          <p:nvPr/>
+        </p:nvCxnSpPr>
+        <p:spPr>
+          <a:xfrm flipH="1">
+            <a:off x="4798321" y="3057448"/>
+            <a:ext cx="3309" cy="777269"/>
+          </a:xfrm>
+          <a:prstGeom prst="line">
+            <a:avLst/>
+          </a:prstGeom>
+        </p:spPr>
+        <p:style>
+          <a:lnRef idx="1">
+            <a:schemeClr val="accent1"/>
+          </a:lnRef>
+          <a:fillRef idx="0">
+            <a:schemeClr val="accent1"/>
+          </a:fillRef>
+          <a:effectRef idx="0">
+            <a:schemeClr val="accent1"/>
+          </a:effectRef>
+          <a:fontRef idx="minor">
+            <a:schemeClr val="tx1"/>
+          </a:fontRef>
+        </p:style>
+      </p:cxnSp>
+      <p:sp>
+        <p:nvSpPr>
+          <p:cNvPr id="52" name="CuadroTexto 51">
             <a:extLst>
               <a:ext uri="{FF2B5EF4-FFF2-40B4-BE49-F238E27FC236}">
-                <a16:creationId xmlns:a16="http://schemas.microsoft.com/office/drawing/2014/main" id="{78822A2C-6651-4809-B20D-0EADB9BA6CDD}"/>
+                <a16:creationId xmlns:a16="http://schemas.microsoft.com/office/drawing/2014/main" id="{02B0C277-2696-4CDB-956F-F88346418039}"/>
               </a:ext>
             </a:extLst>
           </p:cNvPr>
+          <p:cNvSpPr txBox="1"/>
+          <p:nvPr/>
+        </p:nvSpPr>
+        <p:spPr>
+          <a:xfrm>
+            <a:off x="7841257" y="1485462"/>
+            <a:ext cx="1192699" cy="369332"/>
+          </a:xfrm>
+          <a:prstGeom prst="rect">
+            <a:avLst/>
+          </a:prstGeom>
+          <a:noFill/>
+        </p:spPr>
+        <p:txBody>
+          <a:bodyPr wrap="none" rtlCol="0">
+            <a:spAutoFit/>
+          </a:bodyPr>
+          <a:lstStyle/>
+          <a:p>
+            <a:r>
+              <a:rPr lang="es-ES" dirty="0" smtClean="0"/>
+              <a:t>VARIABLES</a:t>
+            </a:r>
+            <a:endParaRPr lang="en-US" dirty="0"/>
+          </a:p>
+        </p:txBody>
+      </p:sp>
+      <p:sp>
+        <p:nvSpPr>
+          <p:cNvPr id="53" name="CuadroTexto 52">
+            <a:extLst>
+              <a:ext uri="{FF2B5EF4-FFF2-40B4-BE49-F238E27FC236}">
+                <a16:creationId xmlns:a16="http://schemas.microsoft.com/office/drawing/2014/main" id="{02B0C277-2696-4CDB-956F-F88346418039}"/>
+              </a:ext>
+            </a:extLst>
+          </p:cNvPr>
+          <p:cNvSpPr txBox="1"/>
+          <p:nvPr/>
+        </p:nvSpPr>
+        <p:spPr>
+          <a:xfrm>
+            <a:off x="7599772" y="2688115"/>
+            <a:ext cx="341760" cy="369332"/>
+          </a:xfrm>
+          <a:prstGeom prst="rect">
+            <a:avLst/>
+          </a:prstGeom>
+          <a:noFill/>
+        </p:spPr>
+        <p:txBody>
+          <a:bodyPr wrap="none" rtlCol="0">
+            <a:spAutoFit/>
+          </a:bodyPr>
+          <a:lstStyle/>
+          <a:p>
+            <a:r>
+              <a:rPr lang="es-ES" dirty="0" smtClean="0"/>
+              <a:t>&amp;</a:t>
+            </a:r>
+            <a:endParaRPr lang="en-US" dirty="0"/>
+          </a:p>
+        </p:txBody>
+      </p:sp>
+      <p:sp>
+        <p:nvSpPr>
+          <p:cNvPr id="54" name="CuadroTexto 53">
+            <a:extLst>
+              <a:ext uri="{FF2B5EF4-FFF2-40B4-BE49-F238E27FC236}">
+                <a16:creationId xmlns:a16="http://schemas.microsoft.com/office/drawing/2014/main" id="{02B0C277-2696-4CDB-956F-F88346418039}"/>
+              </a:ext>
+            </a:extLst>
+          </p:cNvPr>
+          <p:cNvSpPr txBox="1"/>
+          <p:nvPr/>
+        </p:nvSpPr>
+        <p:spPr>
+          <a:xfrm>
+            <a:off x="8674809" y="2693873"/>
+            <a:ext cx="807913" cy="369332"/>
+          </a:xfrm>
+          <a:prstGeom prst="rect">
+            <a:avLst/>
+          </a:prstGeom>
+          <a:noFill/>
+        </p:spPr>
+        <p:txBody>
+          <a:bodyPr wrap="none" rtlCol="0">
+            <a:spAutoFit/>
+          </a:bodyPr>
+          <a:lstStyle/>
+          <a:p>
+            <a:r>
+              <a:rPr lang="es-ES" dirty="0" smtClean="0"/>
+              <a:t>entero</a:t>
+            </a:r>
+            <a:endParaRPr lang="en-US" dirty="0"/>
+          </a:p>
+        </p:txBody>
+      </p:sp>
+      <p:cxnSp>
+        <p:nvCxnSpPr>
+          <p:cNvPr id="39" name="Conector recto 38"/>
           <p:cNvCxnSpPr>
-            <a:stCxn id="76" idx="2"/>
-            <a:endCxn id="26" idx="0"/>
+            <a:stCxn id="29" idx="0"/>
+            <a:endCxn id="4" idx="2"/>
           </p:cNvCxnSpPr>
           <p:nvPr/>
         </p:nvCxnSpPr>
         <p:spPr>
-          <a:xfrm>
-            <a:off x="7745968" y="1557455"/>
-            <a:ext cx="21048" cy="800688"/>
+          <a:xfrm flipV="1">
+            <a:off x="4840897" y="428994"/>
+            <a:ext cx="1241335" cy="1000206"/>
           </a:xfrm>
           <a:prstGeom prst="line">
             <a:avLst/>
           </a:prstGeom>
+        </p:spPr>
+        <p:style>
+          <a:lnRef idx="1">
+            <a:schemeClr val="accent1"/>
+          </a:lnRef>
+          <a:fillRef idx="0">
+            <a:schemeClr val="accent1"/>
+          </a:fillRef>
+          <a:effectRef idx="0">
+            <a:schemeClr val="accent1"/>
+          </a:effectRef>
+          <a:fontRef idx="minor">
+            <a:schemeClr val="tx1"/>
+          </a:fontRef>
+        </p:style>
+      </p:cxnSp>
+      <p:cxnSp>
+        <p:nvCxnSpPr>
+          <p:cNvPr id="55" name="Conector recto 54"/>
+          <p:cNvCxnSpPr>
+            <a:stCxn id="52" idx="2"/>
+            <a:endCxn id="53" idx="0"/>
+          </p:cNvCxnSpPr>
+          <p:nvPr/>
+        </p:nvCxnSpPr>
+        <p:spPr>
+          <a:xfrm flipH="1">
+            <a:off x="7770652" y="1854794"/>
+            <a:ext cx="666955" cy="833321"/>
+          </a:xfrm>
+          <a:prstGeom prst="line">
+            <a:avLst/>
+          </a:prstGeom>
+          <a:ln>
+            <a:solidFill>
+              <a:schemeClr val="accent4"/>
+            </a:solidFill>
+          </a:ln>
+        </p:spPr>
+        <p:style>
+          <a:lnRef idx="1">
+            <a:schemeClr val="accent1"/>
+          </a:lnRef>
+          <a:fillRef idx="0">
+            <a:schemeClr val="accent1"/>
+          </a:fillRef>
+          <a:effectRef idx="0">
+            <a:schemeClr val="accent1"/>
+          </a:effectRef>
+          <a:fontRef idx="minor">
+            <a:schemeClr val="tx1"/>
+          </a:fontRef>
+        </p:style>
+      </p:cxnSp>
+      <p:cxnSp>
+        <p:nvCxnSpPr>
+          <p:cNvPr id="57" name="Conector recto 56"/>
+          <p:cNvCxnSpPr>
+            <a:stCxn id="52" idx="2"/>
+            <a:endCxn id="54" idx="0"/>
+          </p:cNvCxnSpPr>
+          <p:nvPr/>
+        </p:nvCxnSpPr>
+        <p:spPr>
+          <a:xfrm>
+            <a:off x="8437607" y="1854794"/>
+            <a:ext cx="641159" cy="839079"/>
+          </a:xfrm>
+          <a:prstGeom prst="line">
+            <a:avLst/>
+          </a:prstGeom>
+          <a:ln>
+            <a:solidFill>
+              <a:schemeClr val="accent4"/>
+            </a:solidFill>
+          </a:ln>
         </p:spPr>
         <p:style>
           <a:lnRef idx="1">

</xml_diff>